<commit_message>
small changes to lecture #10
</commit_message>
<xml_diff>
--- a/classes/stats2018/Lecture10.pptx
+++ b/classes/stats2018/Lecture10.pptx
@@ -259,7 +259,7 @@
             <a:fld id="{5C0EE926-3778-4231-96B9-8CC56DC35E95}" type="datetimeFigureOut">
               <a:rPr lang="en-US" smtClean="0"/>
               <a:pPr/>
-              <a:t>2/20/2018</a:t>
+              <a:t>2/24/2018</a:t>
             </a:fld>
             <a:endParaRPr lang="en-US"/>
           </a:p>
@@ -1492,7 +1492,7 @@
             <a:fld id="{1D8BD707-D9CF-40AE-B4C6-C98DA3205C09}" type="datetimeFigureOut">
               <a:rPr lang="en-US" smtClean="0"/>
               <a:pPr/>
-              <a:t>2/20/2018</a:t>
+              <a:t>2/24/2018</a:t>
             </a:fld>
             <a:endParaRPr lang="en-US"/>
           </a:p>
@@ -1657,7 +1657,7 @@
             <a:fld id="{1D8BD707-D9CF-40AE-B4C6-C98DA3205C09}" type="datetimeFigureOut">
               <a:rPr lang="en-US" smtClean="0"/>
               <a:pPr/>
-              <a:t>2/20/2018</a:t>
+              <a:t>2/24/2018</a:t>
             </a:fld>
             <a:endParaRPr lang="en-US"/>
           </a:p>
@@ -1832,7 +1832,7 @@
             <a:fld id="{1D8BD707-D9CF-40AE-B4C6-C98DA3205C09}" type="datetimeFigureOut">
               <a:rPr lang="en-US" smtClean="0"/>
               <a:pPr/>
-              <a:t>2/20/2018</a:t>
+              <a:t>2/24/2018</a:t>
             </a:fld>
             <a:endParaRPr lang="en-US"/>
           </a:p>
@@ -1997,7 +1997,7 @@
             <a:fld id="{1D8BD707-D9CF-40AE-B4C6-C98DA3205C09}" type="datetimeFigureOut">
               <a:rPr lang="en-US" smtClean="0"/>
               <a:pPr/>
-              <a:t>2/20/2018</a:t>
+              <a:t>2/24/2018</a:t>
             </a:fld>
             <a:endParaRPr lang="en-US"/>
           </a:p>
@@ -2239,7 +2239,7 @@
             <a:fld id="{1D8BD707-D9CF-40AE-B4C6-C98DA3205C09}" type="datetimeFigureOut">
               <a:rPr lang="en-US" smtClean="0"/>
               <a:pPr/>
-              <a:t>2/20/2018</a:t>
+              <a:t>2/24/2018</a:t>
             </a:fld>
             <a:endParaRPr lang="en-US"/>
           </a:p>
@@ -2521,7 +2521,7 @@
             <a:fld id="{1D8BD707-D9CF-40AE-B4C6-C98DA3205C09}" type="datetimeFigureOut">
               <a:rPr lang="en-US" smtClean="0"/>
               <a:pPr/>
-              <a:t>2/20/2018</a:t>
+              <a:t>2/24/2018</a:t>
             </a:fld>
             <a:endParaRPr lang="en-US"/>
           </a:p>
@@ -2937,7 +2937,7 @@
             <a:fld id="{1D8BD707-D9CF-40AE-B4C6-C98DA3205C09}" type="datetimeFigureOut">
               <a:rPr lang="en-US" smtClean="0"/>
               <a:pPr/>
-              <a:t>2/20/2018</a:t>
+              <a:t>2/24/2018</a:t>
             </a:fld>
             <a:endParaRPr lang="en-US"/>
           </a:p>
@@ -3051,7 +3051,7 @@
             <a:fld id="{1D8BD707-D9CF-40AE-B4C6-C98DA3205C09}" type="datetimeFigureOut">
               <a:rPr lang="en-US" smtClean="0"/>
               <a:pPr/>
-              <a:t>2/20/2018</a:t>
+              <a:t>2/24/2018</a:t>
             </a:fld>
             <a:endParaRPr lang="en-US"/>
           </a:p>
@@ -3143,7 +3143,7 @@
             <a:fld id="{1D8BD707-D9CF-40AE-B4C6-C98DA3205C09}" type="datetimeFigureOut">
               <a:rPr lang="en-US" smtClean="0"/>
               <a:pPr/>
-              <a:t>2/20/2018</a:t>
+              <a:t>2/24/2018</a:t>
             </a:fld>
             <a:endParaRPr lang="en-US"/>
           </a:p>
@@ -3415,7 +3415,7 @@
             <a:fld id="{1D8BD707-D9CF-40AE-B4C6-C98DA3205C09}" type="datetimeFigureOut">
               <a:rPr lang="en-US" smtClean="0"/>
               <a:pPr/>
-              <a:t>2/20/2018</a:t>
+              <a:t>2/24/2018</a:t>
             </a:fld>
             <a:endParaRPr lang="en-US"/>
           </a:p>
@@ -3664,7 +3664,7 @@
             <a:fld id="{1D8BD707-D9CF-40AE-B4C6-C98DA3205C09}" type="datetimeFigureOut">
               <a:rPr lang="en-US" smtClean="0"/>
               <a:pPr/>
-              <a:t>2/20/2018</a:t>
+              <a:t>2/24/2018</a:t>
             </a:fld>
             <a:endParaRPr lang="en-US"/>
           </a:p>
@@ -3872,7 +3872,7 @@
             <a:fld id="{1D8BD707-D9CF-40AE-B4C6-C98DA3205C09}" type="datetimeFigureOut">
               <a:rPr lang="en-US" smtClean="0"/>
               <a:pPr/>
-              <a:t>2/20/2018</a:t>
+              <a:t>2/24/2018</a:t>
             </a:fld>
             <a:endParaRPr lang="en-US"/>
           </a:p>
@@ -9766,7 +9766,7 @@
         </p:nvCxnSpPr>
         <p:spPr>
           <a:xfrm flipH="1" flipV="1">
-            <a:off x="2895600" y="2994243"/>
+            <a:off x="3200400" y="2994243"/>
             <a:ext cx="762000" cy="1015782"/>
           </a:xfrm>
           <a:prstGeom prst="straightConnector1">

</xml_diff>